<commit_message>
Post Section 3 Video 6
</commit_message>
<xml_diff>
--- a/Sections/Section 3/Entity Fundamentals Using .NET 6_Section 3.pptx
+++ b/Sections/Section 3/Entity Fundamentals Using .NET 6_Section 3.pptx
@@ -227,7 +227,7 @@
           <a:p>
             <a:fld id="{39C05CB7-7154-42F2-8D93-1E20B1508952}" type="datetimeFigureOut">
               <a:rPr lang="en-US" smtClean="0"/>
-              <a:t>4/3/2022</a:t>
+              <a:t>4/11/2022</a:t>
             </a:fld>
             <a:endParaRPr lang="en-US"/>
           </a:p>
@@ -392,7 +392,7 @@
           <a:p>
             <a:fld id="{8E1E840F-9B2B-44B5-896B-5B857B514EB5}" type="datetimeFigureOut">
               <a:rPr lang="en-US" smtClean="0"/>
-              <a:t>4/3/2022</a:t>
+              <a:t>4/11/2022</a:t>
             </a:fld>
             <a:endParaRPr lang="en-US"/>
           </a:p>
@@ -9361,7 +9361,7 @@
         <p:spPr>
           <a:xfrm>
             <a:off x="447876" y="1084859"/>
-            <a:ext cx="8248247" cy="2267287"/>
+            <a:ext cx="8248247" cy="3375283"/>
           </a:xfrm>
           <a:prstGeom prst="rect">
             <a:avLst/>
@@ -9386,7 +9386,32 @@
                   <a:schemeClr val="bg1"/>
                 </a:solidFill>
               </a:rPr>
-              <a:t>Generate SP for Insert, Update, Delete Operations</a:t>
+              <a:t>NO LONGER SUPPORTED: Generate SP for Insert, Update, Delete Operations</a:t>
+            </a:r>
+          </a:p>
+          <a:p>
+            <a:pPr marL="628650" lvl="1" indent="-285750">
+              <a:lnSpc>
+                <a:spcPct val="150000"/>
+              </a:lnSpc>
+              <a:buFont typeface="Wingdings" panose="05000000000000000000" pitchFamily="2" charset="2"/>
+              <a:buChar char="q"/>
+            </a:pPr>
+            <a:r>
+              <a:rPr lang="en-US" sz="1600" dirty="0" err="1">
+                <a:solidFill>
+                  <a:schemeClr val="bg1"/>
+                </a:solidFill>
+              </a:rPr>
+              <a:t>MapToStoredProcedures</a:t>
+            </a:r>
+            <a:r>
+              <a:rPr lang="en-US" sz="1600" dirty="0">
+                <a:solidFill>
+                  <a:schemeClr val="bg1"/>
+                </a:solidFill>
+              </a:rPr>
+              <a:t>() gone! </a:t>
             </a:r>
           </a:p>
           <a:p>
@@ -9426,7 +9451,7 @@
                 </a:solidFill>
                 <a:sym typeface="Wingdings" panose="05000000000000000000" pitchFamily="2" charset="2"/>
               </a:rPr>
-              <a:t> Custom</a:t>
+              <a:t> Table / Custom</a:t>
             </a:r>
             <a:r>
               <a:rPr lang="en-US" sz="1600" dirty="0">
@@ -9434,7 +9459,7 @@
                   <a:schemeClr val="bg1"/>
                 </a:solidFill>
               </a:rPr>
-              <a:t> Result Sets</a:t>
+              <a:t> Result Sets [dataset based]</a:t>
             </a:r>
           </a:p>
           <a:p>
@@ -9465,14 +9490,108 @@
                   <a:schemeClr val="bg1"/>
                 </a:solidFill>
               </a:rPr>
-              <a:t>Business Processes (dataset based)</a:t>
+              <a:t>Use </a:t>
+            </a:r>
+            <a:r>
+              <a:rPr lang="en-US" sz="1600" dirty="0" err="1">
+                <a:solidFill>
+                  <a:schemeClr val="bg1"/>
+                </a:solidFill>
+              </a:rPr>
+              <a:t>FromSqlRaw</a:t>
+            </a:r>
+            <a:endParaRPr lang="en-US" sz="1600" dirty="0">
+              <a:solidFill>
+                <a:schemeClr val="bg1"/>
+              </a:solidFill>
+            </a:endParaRPr>
+          </a:p>
+          <a:p>
+            <a:pPr marL="285750" indent="-285750">
+              <a:lnSpc>
+                <a:spcPct val="150000"/>
+              </a:lnSpc>
+              <a:buFont typeface="Wingdings" panose="05000000000000000000" pitchFamily="2" charset="2"/>
+              <a:buChar char="q"/>
+            </a:pPr>
+            <a:endParaRPr lang="en-US" sz="1600" dirty="0">
+              <a:solidFill>
+                <a:schemeClr val="bg1"/>
+              </a:solidFill>
+            </a:endParaRPr>
+          </a:p>
+          <a:p>
+            <a:pPr marL="285750" indent="-285750">
+              <a:lnSpc>
+                <a:spcPct val="150000"/>
+              </a:lnSpc>
+              <a:buFont typeface="Wingdings" panose="05000000000000000000" pitchFamily="2" charset="2"/>
+              <a:buChar char="q"/>
+            </a:pPr>
+            <a:r>
+              <a:rPr lang="en-US" sz="1600" dirty="0">
+                <a:solidFill>
+                  <a:schemeClr val="bg1"/>
+                </a:solidFill>
+              </a:rPr>
+              <a:t>Bind </a:t>
+            </a:r>
+            <a:r>
+              <a:rPr lang="en-US" sz="1600" dirty="0" err="1">
+                <a:solidFill>
+                  <a:schemeClr val="bg1"/>
+                </a:solidFill>
+              </a:rPr>
+              <a:t>Pameters</a:t>
+            </a:r>
+            <a:r>
+              <a:rPr lang="en-US" sz="1600" dirty="0">
+                <a:solidFill>
+                  <a:schemeClr val="bg1"/>
+                </a:solidFill>
+              </a:rPr>
+              <a:t> using </a:t>
+            </a:r>
+            <a:r>
+              <a:rPr lang="en-US" sz="1600" dirty="0" err="1">
+                <a:solidFill>
+                  <a:schemeClr val="bg1"/>
+                </a:solidFill>
+              </a:rPr>
+              <a:t>SqlParameters</a:t>
+            </a:r>
+            <a:r>
+              <a:rPr lang="en-US" sz="1600" dirty="0">
+                <a:solidFill>
+                  <a:schemeClr val="bg1"/>
+                </a:solidFill>
+              </a:rPr>
+              <a:t> – avoid </a:t>
+            </a:r>
+            <a:r>
+              <a:rPr lang="en-US" sz="1600" dirty="0" err="1">
+                <a:solidFill>
+                  <a:schemeClr val="bg1"/>
+                </a:solidFill>
+              </a:rPr>
+              <a:t>Sql</a:t>
+            </a:r>
+            <a:r>
+              <a:rPr lang="en-US" sz="1600" dirty="0">
+                <a:solidFill>
+                  <a:schemeClr val="bg1"/>
+                </a:solidFill>
+              </a:rPr>
+              <a:t> Injection Attacks</a:t>
             </a:r>
           </a:p>
           <a:p>
-            <a:pPr>
+            <a:pPr marL="285750" indent="-285750">
               <a:lnSpc>
                 <a:spcPct val="150000"/>
               </a:lnSpc>
+              <a:buFont typeface="Wingdings" panose="05000000000000000000" pitchFamily="2" charset="2"/>
+              <a:buChar char="q"/>
             </a:pPr>
             <a:endParaRPr lang="en-US" sz="1600" dirty="0">
               <a:solidFill>
@@ -9517,6 +9636,252 @@
               <a:solidFill>
                 <a:schemeClr val="accent5"/>
               </a:solidFill>
+            </a:endParaRPr>
+          </a:p>
+        </p:txBody>
+      </p:sp>
+      <p:sp>
+        <p:nvSpPr>
+          <p:cNvPr id="3" name="Rectangle 1">
+            <a:extLst>
+              <a:ext uri="{FF2B5EF4-FFF2-40B4-BE49-F238E27FC236}">
+                <a16:creationId xmlns:a16="http://schemas.microsoft.com/office/drawing/2014/main" id="{D57A58A8-0A79-45AB-A5B5-E22890646246}"/>
+              </a:ext>
+            </a:extLst>
+          </p:cNvPr>
+          <p:cNvSpPr>
+            <a:spLocks noChangeArrowheads="1"/>
+          </p:cNvSpPr>
+          <p:nvPr/>
+        </p:nvSpPr>
+        <p:spPr bwMode="auto">
+          <a:xfrm>
+            <a:off x="0" y="143961"/>
+            <a:ext cx="43282" cy="169277"/>
+          </a:xfrm>
+          <a:prstGeom prst="rect">
+            <a:avLst/>
+          </a:prstGeom>
+          <a:noFill/>
+          <a:ln>
+            <a:noFill/>
+          </a:ln>
+          <a:effectLst/>
+          <a:extLst>
+            <a:ext uri="{909E8E84-426E-40DD-AFC4-6F175D3DCCD1}">
+              <a14:hiddenFill xmlns:a14="http://schemas.microsoft.com/office/drawing/2010/main">
+                <a:solidFill>
+                  <a:schemeClr val="accent1"/>
+                </a:solidFill>
+              </a14:hiddenFill>
+            </a:ext>
+            <a:ext uri="{91240B29-F687-4F45-9708-019B960494DF}">
+              <a14:hiddenLine xmlns:a14="http://schemas.microsoft.com/office/drawing/2010/main" w="9525">
+                <a:solidFill>
+                  <a:schemeClr val="tx1"/>
+                </a:solidFill>
+                <a:miter lim="800000"/>
+                <a:headEnd/>
+                <a:tailEnd/>
+              </a14:hiddenLine>
+            </a:ext>
+            <a:ext uri="{AF507438-7753-43E0-B8FC-AC1667EBCBE1}">
+              <a14:hiddenEffects xmlns:a14="http://schemas.microsoft.com/office/drawing/2010/main">
+                <a:effectLst>
+                  <a:outerShdw dist="35921" dir="2700000" algn="ctr" rotWithShape="0">
+                    <a:schemeClr val="bg2"/>
+                  </a:outerShdw>
+                </a:effectLst>
+              </a14:hiddenEffects>
+            </a:ext>
+          </a:extLst>
+        </p:spPr>
+        <p:txBody>
+          <a:bodyPr vert="horz" wrap="none" lIns="0" tIns="0" rIns="0" bIns="0" numCol="1" anchor="ctr" anchorCtr="0" compatLnSpc="1">
+            <a:prstTxWarp prst="textNoShape">
+              <a:avLst/>
+            </a:prstTxWarp>
+            <a:spAutoFit/>
+          </a:bodyPr>
+          <a:lstStyle>
+            <a:lvl1pPr eaLnBrk="0" fontAlgn="base" hangingPunct="0">
+              <a:spcBef>
+                <a:spcPct val="0"/>
+              </a:spcBef>
+              <a:spcAft>
+                <a:spcPct val="0"/>
+              </a:spcAft>
+              <a:defRPr>
+                <a:solidFill>
+                  <a:schemeClr val="tx1"/>
+                </a:solidFill>
+                <a:latin typeface="Arial" panose="020B0604020202020204" pitchFamily="34" charset="0"/>
+              </a:defRPr>
+            </a:lvl1pPr>
+            <a:lvl2pPr marL="457200" eaLnBrk="0" fontAlgn="base" hangingPunct="0">
+              <a:spcBef>
+                <a:spcPct val="0"/>
+              </a:spcBef>
+              <a:spcAft>
+                <a:spcPct val="0"/>
+              </a:spcAft>
+              <a:defRPr>
+                <a:solidFill>
+                  <a:schemeClr val="tx1"/>
+                </a:solidFill>
+                <a:latin typeface="Arial" panose="020B0604020202020204" pitchFamily="34" charset="0"/>
+              </a:defRPr>
+            </a:lvl2pPr>
+            <a:lvl3pPr marL="914400" eaLnBrk="0" fontAlgn="base" hangingPunct="0">
+              <a:spcBef>
+                <a:spcPct val="0"/>
+              </a:spcBef>
+              <a:spcAft>
+                <a:spcPct val="0"/>
+              </a:spcAft>
+              <a:defRPr>
+                <a:solidFill>
+                  <a:schemeClr val="tx1"/>
+                </a:solidFill>
+                <a:latin typeface="Arial" panose="020B0604020202020204" pitchFamily="34" charset="0"/>
+              </a:defRPr>
+            </a:lvl3pPr>
+            <a:lvl4pPr marL="1371600" eaLnBrk="0" fontAlgn="base" hangingPunct="0">
+              <a:spcBef>
+                <a:spcPct val="0"/>
+              </a:spcBef>
+              <a:spcAft>
+                <a:spcPct val="0"/>
+              </a:spcAft>
+              <a:defRPr>
+                <a:solidFill>
+                  <a:schemeClr val="tx1"/>
+                </a:solidFill>
+                <a:latin typeface="Arial" panose="020B0604020202020204" pitchFamily="34" charset="0"/>
+              </a:defRPr>
+            </a:lvl4pPr>
+            <a:lvl5pPr marL="1828800" eaLnBrk="0" fontAlgn="base" hangingPunct="0">
+              <a:spcBef>
+                <a:spcPct val="0"/>
+              </a:spcBef>
+              <a:spcAft>
+                <a:spcPct val="0"/>
+              </a:spcAft>
+              <a:defRPr>
+                <a:solidFill>
+                  <a:schemeClr val="tx1"/>
+                </a:solidFill>
+                <a:latin typeface="Arial" panose="020B0604020202020204" pitchFamily="34" charset="0"/>
+              </a:defRPr>
+            </a:lvl5pPr>
+            <a:lvl6pPr marL="2286000" eaLnBrk="0" fontAlgn="base" hangingPunct="0">
+              <a:spcBef>
+                <a:spcPct val="0"/>
+              </a:spcBef>
+              <a:spcAft>
+                <a:spcPct val="0"/>
+              </a:spcAft>
+              <a:defRPr>
+                <a:solidFill>
+                  <a:schemeClr val="tx1"/>
+                </a:solidFill>
+                <a:latin typeface="Arial" panose="020B0604020202020204" pitchFamily="34" charset="0"/>
+              </a:defRPr>
+            </a:lvl6pPr>
+            <a:lvl7pPr marL="2743200" eaLnBrk="0" fontAlgn="base" hangingPunct="0">
+              <a:spcBef>
+                <a:spcPct val="0"/>
+              </a:spcBef>
+              <a:spcAft>
+                <a:spcPct val="0"/>
+              </a:spcAft>
+              <a:defRPr>
+                <a:solidFill>
+                  <a:schemeClr val="tx1"/>
+                </a:solidFill>
+                <a:latin typeface="Arial" panose="020B0604020202020204" pitchFamily="34" charset="0"/>
+              </a:defRPr>
+            </a:lvl7pPr>
+            <a:lvl8pPr marL="3200400" eaLnBrk="0" fontAlgn="base" hangingPunct="0">
+              <a:spcBef>
+                <a:spcPct val="0"/>
+              </a:spcBef>
+              <a:spcAft>
+                <a:spcPct val="0"/>
+              </a:spcAft>
+              <a:defRPr>
+                <a:solidFill>
+                  <a:schemeClr val="tx1"/>
+                </a:solidFill>
+                <a:latin typeface="Arial" panose="020B0604020202020204" pitchFamily="34" charset="0"/>
+              </a:defRPr>
+            </a:lvl8pPr>
+            <a:lvl9pPr marL="3657600" eaLnBrk="0" fontAlgn="base" hangingPunct="0">
+              <a:spcBef>
+                <a:spcPct val="0"/>
+              </a:spcBef>
+              <a:spcAft>
+                <a:spcPct val="0"/>
+              </a:spcAft>
+              <a:defRPr>
+                <a:solidFill>
+                  <a:schemeClr val="tx1"/>
+                </a:solidFill>
+                <a:latin typeface="Arial" panose="020B0604020202020204" pitchFamily="34" charset="0"/>
+              </a:defRPr>
+            </a:lvl9pPr>
+          </a:lstStyle>
+          <a:p>
+            <a:pPr marL="0" marR="0" lvl="0" indent="0" algn="l" defTabSz="914400" rtl="0" eaLnBrk="0" fontAlgn="base" latinLnBrk="0" hangingPunct="0">
+              <a:lnSpc>
+                <a:spcPct val="100000"/>
+              </a:lnSpc>
+              <a:spcBef>
+                <a:spcPct val="0"/>
+              </a:spcBef>
+              <a:spcAft>
+                <a:spcPct val="0"/>
+              </a:spcAft>
+              <a:buClrTx/>
+              <a:buSzTx/>
+              <a:buFontTx/>
+              <a:buNone/>
+              <a:tabLst/>
+            </a:pPr>
+            <a:r>
+              <a:rPr kumimoji="0" lang="en-US" altLang="en-US" sz="1100" b="0" i="0" u="none" strike="noStrike" cap="none" normalizeH="0" baseline="0" dirty="0">
+                <a:ln>
+                  <a:noFill/>
+                </a:ln>
+                <a:solidFill>
+                  <a:srgbClr val="232629"/>
+                </a:solidFill>
+                <a:effectLst/>
+                <a:latin typeface="-apple-system"/>
+              </a:rPr>
+              <a:t> </a:t>
+            </a:r>
+            <a:r>
+              <a:rPr kumimoji="0" lang="en-US" altLang="en-US" sz="300" b="0" i="0" u="none" strike="noStrike" cap="none" normalizeH="0" baseline="0" dirty="0">
+                <a:ln>
+                  <a:noFill/>
+                </a:ln>
+                <a:solidFill>
+                  <a:schemeClr val="tx1"/>
+                </a:solidFill>
+                <a:effectLst/>
+              </a:rPr>
+              <a:t> </a:t>
+            </a:r>
+            <a:endParaRPr kumimoji="0" lang="en-US" altLang="en-US" sz="1800" b="0" i="0" u="none" strike="noStrike" cap="none" normalizeH="0" baseline="0" dirty="0">
+              <a:ln>
+                <a:noFill/>
+              </a:ln>
+              <a:solidFill>
+                <a:schemeClr val="tx1"/>
+              </a:solidFill>
+              <a:effectLst/>
+              <a:latin typeface="Arial" panose="020B0604020202020204" pitchFamily="34" charset="0"/>
             </a:endParaRPr>
           </a:p>
         </p:txBody>
@@ -10788,7 +11153,23 @@
                   <a:schemeClr val="bg1"/>
                 </a:solidFill>
               </a:rPr>
-              <a:t>Custom Queries </a:t>
+              <a:t>Custom Queries (can be </a:t>
+            </a:r>
+            <a:r>
+              <a:rPr lang="en-US" sz="1600" dirty="0" err="1">
+                <a:solidFill>
+                  <a:schemeClr val="bg1"/>
+                </a:solidFill>
+              </a:rPr>
+              <a:t>StoredProcedures</a:t>
+            </a:r>
+            <a:r>
+              <a:rPr lang="en-US" sz="1600" dirty="0">
+                <a:solidFill>
+                  <a:schemeClr val="bg1"/>
+                </a:solidFill>
+              </a:rPr>
+              <a:t>)</a:t>
             </a:r>
           </a:p>
           <a:p>
@@ -10819,7 +11200,39 @@
                   <a:schemeClr val="bg1"/>
                 </a:solidFill>
               </a:rPr>
-              <a:t>Custom Result Sets – Map to Class</a:t>
+              <a:t>Custom Result Sets – Map to Class (return </a:t>
+            </a:r>
+            <a:r>
+              <a:rPr lang="en-US" sz="1600" dirty="0" err="1">
+                <a:solidFill>
+                  <a:schemeClr val="bg1"/>
+                </a:solidFill>
+              </a:rPr>
+              <a:t>IEnumerable</a:t>
+            </a:r>
+            <a:r>
+              <a:rPr lang="en-US" sz="1600" dirty="0">
+                <a:solidFill>
+                  <a:schemeClr val="bg1"/>
+                </a:solidFill>
+              </a:rPr>
+              <a:t>&lt;</a:t>
+            </a:r>
+            <a:r>
+              <a:rPr lang="en-US" sz="1600" b="1" i="1" dirty="0" err="1">
+                <a:solidFill>
+                  <a:srgbClr val="FF0000"/>
+                </a:solidFill>
+              </a:rPr>
+              <a:t>ClassName</a:t>
+            </a:r>
+            <a:r>
+              <a:rPr lang="en-US" sz="1600" dirty="0">
+                <a:solidFill>
+                  <a:schemeClr val="bg1"/>
+                </a:solidFill>
+              </a:rPr>
+              <a:t>&gt; results)</a:t>
             </a:r>
           </a:p>
           <a:p>
@@ -10850,8 +11263,21 @@
                   <a:schemeClr val="bg1"/>
                 </a:solidFill>
               </a:rPr>
-              <a:t>Custom Business Processes (void results)</a:t>
+              <a:t>Custom Business Processes (void results – Return </a:t>
             </a:r>
+            <a:r>
+              <a:rPr lang="en-US" sz="1600">
+                <a:solidFill>
+                  <a:schemeClr val="bg1"/>
+                </a:solidFill>
+              </a:rPr>
+              <a:t>Status only)</a:t>
+            </a:r>
+            <a:endParaRPr lang="en-US" sz="1600" dirty="0">
+              <a:solidFill>
+                <a:schemeClr val="bg1"/>
+              </a:solidFill>
+            </a:endParaRPr>
           </a:p>
           <a:p>
             <a:pPr>

</xml_diff>